<commit_message>
Fix path to template
</commit_message>
<xml_diff>
--- a/arm/doc/azocpupidemo2.pptx
+++ b/arm/doc/azocpupidemo2.pptx
@@ -6,13 +6,17 @@
   </p:sldMasterIdLst>
   <p:sldIdLst>
     <p:sldId id="256" r:id="rId2"/>
-    <p:sldId id="284" r:id="rId3"/>
-    <p:sldId id="283" r:id="rId4"/>
-    <p:sldId id="285" r:id="rId5"/>
-    <p:sldId id="286" r:id="rId6"/>
-    <p:sldId id="287" r:id="rId7"/>
-    <p:sldId id="279" r:id="rId8"/>
-    <p:sldId id="282" r:id="rId9"/>
+    <p:sldId id="291" r:id="rId3"/>
+    <p:sldId id="284" r:id="rId4"/>
+    <p:sldId id="283" r:id="rId5"/>
+    <p:sldId id="285" r:id="rId6"/>
+    <p:sldId id="286" r:id="rId7"/>
+    <p:sldId id="287" r:id="rId8"/>
+    <p:sldId id="288" r:id="rId9"/>
+    <p:sldId id="289" r:id="rId10"/>
+    <p:sldId id="290" r:id="rId11"/>
+    <p:sldId id="279" r:id="rId12"/>
+    <p:sldId id="282" r:id="rId13"/>
   </p:sldIdLst>
   <p:sldSz cx="12192000" cy="6858000"/>
   <p:notesSz cx="6858000" cy="9144000"/>
@@ -250,7 +254,7 @@
           <a:p>
             <a:fld id="{9184DA70-C731-4C70-880D-CCD4705E623C}" type="datetime1">
               <a:rPr lang="en-US" smtClean="0"/>
-              <a:t>10/11/19</a:t>
+              <a:t>10/16/19</a:t>
             </a:fld>
             <a:endParaRPr lang="en-US" dirty="0"/>
           </a:p>
@@ -420,7 +424,7 @@
           <a:p>
             <a:fld id="{B612A279-0833-481D-8C56-F67FD0AC6C50}" type="datetime1">
               <a:rPr lang="en-US" smtClean="0"/>
-              <a:t>10/11/19</a:t>
+              <a:t>10/16/19</a:t>
             </a:fld>
             <a:endParaRPr lang="en-US" dirty="0"/>
           </a:p>
@@ -600,7 +604,7 @@
           <a:p>
             <a:fld id="{6587DA83-5663-4C9C-B9AA-0B40A3DAFF81}" type="datetime1">
               <a:rPr lang="en-US" smtClean="0"/>
-              <a:t>10/11/19</a:t>
+              <a:t>10/16/19</a:t>
             </a:fld>
             <a:endParaRPr lang="en-US" dirty="0"/>
           </a:p>
@@ -770,7 +774,7 @@
           <a:p>
             <a:fld id="{4BE1D723-8F53-4F53-90B0-1982A396982E}" type="datetime1">
               <a:rPr lang="en-US" smtClean="0"/>
-              <a:t>10/11/19</a:t>
+              <a:t>10/16/19</a:t>
             </a:fld>
             <a:endParaRPr lang="en-US" dirty="0"/>
           </a:p>
@@ -1016,7 +1020,7 @@
           <a:p>
             <a:fld id="{97669AF7-7BEB-44E4-9852-375E34362B5B}" type="datetime1">
               <a:rPr lang="en-US" smtClean="0"/>
-              <a:t>10/11/19</a:t>
+              <a:t>10/16/19</a:t>
             </a:fld>
             <a:endParaRPr lang="en-US" dirty="0"/>
           </a:p>
@@ -1248,7 +1252,7 @@
           <a:p>
             <a:fld id="{BAAAC38D-0552-4C82-B593-E6124DFADBE2}" type="datetime1">
               <a:rPr lang="en-US" smtClean="0"/>
-              <a:t>10/11/19</a:t>
+              <a:t>10/16/19</a:t>
             </a:fld>
             <a:endParaRPr lang="en-US" dirty="0"/>
           </a:p>
@@ -1615,7 +1619,7 @@
           <a:p>
             <a:fld id="{D9DF0F1C-5577-4ACB-BB62-DF8F3C494C7E}" type="datetime1">
               <a:rPr lang="en-US" smtClean="0"/>
-              <a:t>10/11/19</a:t>
+              <a:t>10/16/19</a:t>
             </a:fld>
             <a:endParaRPr lang="en-US" dirty="0"/>
           </a:p>
@@ -1733,7 +1737,7 @@
           <a:p>
             <a:fld id="{1775B394-D9F9-4F0C-B15D-605F45CB9E9F}" type="datetime1">
               <a:rPr lang="en-US" smtClean="0"/>
-              <a:t>10/11/19</a:t>
+              <a:t>10/16/19</a:t>
             </a:fld>
             <a:endParaRPr lang="en-US" dirty="0"/>
           </a:p>
@@ -1828,7 +1832,7 @@
           <a:p>
             <a:fld id="{39667345-2558-425A-8533-9BFDBCE15005}" type="datetime1">
               <a:rPr lang="en-US" smtClean="0"/>
-              <a:t>10/11/19</a:t>
+              <a:t>10/16/19</a:t>
             </a:fld>
             <a:endParaRPr lang="en-US" dirty="0"/>
           </a:p>
@@ -2105,7 +2109,7 @@
           <a:p>
             <a:fld id="{92BEA474-078D-4E9B-9B14-09A87B19DC46}" type="datetime1">
               <a:rPr lang="en-US" smtClean="0"/>
-              <a:t>10/11/19</a:t>
+              <a:t>10/16/19</a:t>
             </a:fld>
             <a:endParaRPr lang="en-US" dirty="0"/>
           </a:p>
@@ -2363,7 +2367,7 @@
           <a:p>
             <a:fld id="{4907D986-8816-4272-A432-0437A28A9828}" type="datetime1">
               <a:rPr lang="en-US" smtClean="0"/>
-              <a:t>10/11/19</a:t>
+              <a:t>10/16/19</a:t>
             </a:fld>
             <a:endParaRPr lang="en-US" dirty="0"/>
           </a:p>
@@ -2577,7 +2581,7 @@
           <a:p>
             <a:fld id="{62D6E202-B606-4609-B914-27C9371A1F6D}" type="datetime1">
               <a:rPr lang="en-US" smtClean="0"/>
-              <a:t>10/11/19</a:t>
+              <a:t>10/16/19</a:t>
             </a:fld>
             <a:endParaRPr lang="en-US" dirty="0"/>
           </a:p>
@@ -3132,7 +3136,596 @@
 </p:sld>
 </file>
 
+<file path=ppt/slides/slide10.xml><?xml version="1.0" encoding="utf-8"?>
+<p:sld xmlns:a="http://schemas.openxmlformats.org/drawingml/2006/main" xmlns:r="http://schemas.openxmlformats.org/officeDocument/2006/relationships" xmlns:p="http://schemas.openxmlformats.org/presentationml/2006/main">
+  <p:cSld>
+    <p:spTree>
+      <p:nvGrpSpPr>
+        <p:cNvPr id="1" name=""/>
+        <p:cNvGrpSpPr/>
+        <p:nvPr/>
+      </p:nvGrpSpPr>
+      <p:grpSpPr>
+        <a:xfrm>
+          <a:off x="0" y="0"/>
+          <a:ext cx="0" cy="0"/>
+          <a:chOff x="0" y="0"/>
+          <a:chExt cx="0" cy="0"/>
+        </a:xfrm>
+      </p:grpSpPr>
+      <p:sp>
+        <p:nvSpPr>
+          <p:cNvPr id="2" name="Title 1">
+            <a:extLst>
+              <a:ext uri="{FF2B5EF4-FFF2-40B4-BE49-F238E27FC236}">
+                <a16:creationId xmlns:a16="http://schemas.microsoft.com/office/drawing/2014/main" id="{47F4BDD8-2DA8-DB49-8DA7-6D86EA375178}"/>
+              </a:ext>
+            </a:extLst>
+          </p:cNvPr>
+          <p:cNvSpPr>
+            <a:spLocks noGrp="1"/>
+          </p:cNvSpPr>
+          <p:nvPr>
+            <p:ph type="title"/>
+          </p:nvPr>
+        </p:nvSpPr>
+        <p:spPr/>
+        <p:txBody>
+          <a:bodyPr/>
+          <a:lstStyle/>
+          <a:p>
+            <a:r>
+              <a:rPr lang="en-US" dirty="0"/>
+              <a:t>Card – Move to 4.2</a:t>
+            </a:r>
+          </a:p>
+        </p:txBody>
+      </p:sp>
+      <p:sp>
+        <p:nvSpPr>
+          <p:cNvPr id="3" name="Content Placeholder 2">
+            <a:extLst>
+              <a:ext uri="{FF2B5EF4-FFF2-40B4-BE49-F238E27FC236}">
+                <a16:creationId xmlns:a16="http://schemas.microsoft.com/office/drawing/2014/main" id="{40F46410-39B3-7243-B1CE-8924B68C7596}"/>
+              </a:ext>
+            </a:extLst>
+          </p:cNvPr>
+          <p:cNvSpPr>
+            <a:spLocks noGrp="1"/>
+          </p:cNvSpPr>
+          <p:nvPr>
+            <p:ph idx="1"/>
+          </p:nvPr>
+        </p:nvSpPr>
+        <p:spPr/>
+        <p:txBody>
+          <a:bodyPr/>
+          <a:lstStyle/>
+          <a:p>
+            <a:r>
+              <a:rPr lang="en-US" dirty="0"/>
+              <a:t>Changed Folder structure to be version independent</a:t>
+            </a:r>
+          </a:p>
+          <a:p>
+            <a:r>
+              <a:rPr lang="en-US" dirty="0"/>
+              <a:t>Added nightly build “Internal” script to pull installer</a:t>
+            </a:r>
+          </a:p>
+          <a:p>
+            <a:r>
+              <a:rPr lang="en-US" dirty="0"/>
+              <a:t>Changed </a:t>
+            </a:r>
+            <a:r>
+              <a:rPr lang="en-US" dirty="0" err="1"/>
+              <a:t>rhcos</a:t>
+            </a:r>
+            <a:r>
+              <a:rPr lang="en-US" dirty="0"/>
+              <a:t> version and storage account source</a:t>
+            </a:r>
+          </a:p>
+          <a:p>
+            <a:r>
+              <a:rPr lang="en-US" dirty="0"/>
+              <a:t>Change scripts to reflect above</a:t>
+            </a:r>
+          </a:p>
+          <a:p>
+            <a:endParaRPr lang="en-US" dirty="0"/>
+          </a:p>
+        </p:txBody>
+      </p:sp>
+      <p:pic>
+        <p:nvPicPr>
+          <p:cNvPr id="5" name="Picture 4">
+            <a:extLst>
+              <a:ext uri="{FF2B5EF4-FFF2-40B4-BE49-F238E27FC236}">
+                <a16:creationId xmlns:a16="http://schemas.microsoft.com/office/drawing/2014/main" id="{5C52BCEE-AE08-6943-84D9-C135742DCD18}"/>
+              </a:ext>
+            </a:extLst>
+          </p:cNvPr>
+          <p:cNvPicPr>
+            <a:picLocks noChangeAspect="1"/>
+          </p:cNvPicPr>
+          <p:nvPr/>
+        </p:nvPicPr>
+        <p:blipFill>
+          <a:blip r:embed="rId2"/>
+          <a:stretch>
+            <a:fillRect/>
+          </a:stretch>
+        </p:blipFill>
+        <p:spPr>
+          <a:xfrm>
+            <a:off x="3355159" y="4181021"/>
+            <a:ext cx="5194300" cy="977900"/>
+          </a:xfrm>
+          <a:prstGeom prst="rect">
+            <a:avLst/>
+          </a:prstGeom>
+        </p:spPr>
+      </p:pic>
+    </p:spTree>
+    <p:extLst>
+      <p:ext uri="{BB962C8B-B14F-4D97-AF65-F5344CB8AC3E}">
+        <p14:creationId xmlns:p14="http://schemas.microsoft.com/office/powerpoint/2010/main" val="1307658540"/>
+      </p:ext>
+    </p:extLst>
+  </p:cSld>
+  <p:clrMapOvr>
+    <a:masterClrMapping/>
+  </p:clrMapOvr>
+</p:sld>
+</file>
+
+<file path=ppt/slides/slide11.xml><?xml version="1.0" encoding="utf-8"?>
+<p:sld xmlns:a="http://schemas.openxmlformats.org/drawingml/2006/main" xmlns:r="http://schemas.openxmlformats.org/officeDocument/2006/relationships" xmlns:p="http://schemas.openxmlformats.org/presentationml/2006/main">
+  <p:cSld>
+    <p:spTree>
+      <p:nvGrpSpPr>
+        <p:cNvPr id="1" name=""/>
+        <p:cNvGrpSpPr/>
+        <p:nvPr/>
+      </p:nvGrpSpPr>
+      <p:grpSpPr>
+        <a:xfrm>
+          <a:off x="0" y="0"/>
+          <a:ext cx="0" cy="0"/>
+          <a:chOff x="0" y="0"/>
+          <a:chExt cx="0" cy="0"/>
+        </a:xfrm>
+      </p:grpSpPr>
+      <p:sp>
+        <p:nvSpPr>
+          <p:cNvPr id="2" name="Title 1">
+            <a:extLst>
+              <a:ext uri="{FF2B5EF4-FFF2-40B4-BE49-F238E27FC236}">
+                <a16:creationId xmlns:a16="http://schemas.microsoft.com/office/drawing/2014/main" id="{F11BB6C5-B0BC-284D-B750-03E902999E52}"/>
+              </a:ext>
+            </a:extLst>
+          </p:cNvPr>
+          <p:cNvSpPr>
+            <a:spLocks noGrp="1"/>
+          </p:cNvSpPr>
+          <p:nvPr>
+            <p:ph type="title"/>
+          </p:nvPr>
+        </p:nvSpPr>
+        <p:spPr/>
+        <p:txBody>
+          <a:bodyPr/>
+          <a:lstStyle/>
+          <a:p>
+            <a:r>
+              <a:rPr lang="en-US" dirty="0"/>
+              <a:t>Current Status</a:t>
+            </a:r>
+          </a:p>
+        </p:txBody>
+      </p:sp>
+      <p:sp>
+        <p:nvSpPr>
+          <p:cNvPr id="3" name="Content Placeholder 2">
+            <a:extLst>
+              <a:ext uri="{FF2B5EF4-FFF2-40B4-BE49-F238E27FC236}">
+                <a16:creationId xmlns:a16="http://schemas.microsoft.com/office/drawing/2014/main" id="{F2711C76-5A4E-C342-B33A-483915423E9F}"/>
+              </a:ext>
+            </a:extLst>
+          </p:cNvPr>
+          <p:cNvSpPr>
+            <a:spLocks noGrp="1"/>
+          </p:cNvSpPr>
+          <p:nvPr>
+            <p:ph idx="1"/>
+          </p:nvPr>
+        </p:nvSpPr>
+        <p:spPr/>
+        <p:txBody>
+          <a:bodyPr/>
+          <a:lstStyle/>
+          <a:p>
+            <a:r>
+              <a:rPr lang="en-US" dirty="0"/>
+              <a:t>Working:</a:t>
+            </a:r>
+          </a:p>
+          <a:p>
+            <a:pPr lvl="1"/>
+            <a:r>
+              <a:rPr lang="en-US" dirty="0"/>
+              <a:t>Internal Load Balancer is Fixed and Working</a:t>
+            </a:r>
+          </a:p>
+          <a:p>
+            <a:r>
+              <a:rPr lang="en-US" dirty="0"/>
+              <a:t>Not Done/Not Working:</a:t>
+            </a:r>
+          </a:p>
+          <a:p>
+            <a:pPr lvl="1"/>
+            <a:r>
+              <a:rPr lang="en-US" dirty="0"/>
+              <a:t>Flake on one of the masters – </a:t>
+            </a:r>
+            <a:r>
+              <a:rPr lang="en-US" dirty="0" err="1"/>
+              <a:t>kubelet</a:t>
+            </a:r>
+            <a:r>
+              <a:rPr lang="en-US" dirty="0"/>
+              <a:t> not starting Internal LB Not routing/not found by masters</a:t>
+            </a:r>
+          </a:p>
+          <a:p>
+            <a:pPr lvl="1"/>
+            <a:r>
+              <a:rPr lang="en-US" dirty="0"/>
+              <a:t>Need to fix up the apps </a:t>
+            </a:r>
+            <a:r>
+              <a:rPr lang="en-US" dirty="0" err="1"/>
+              <a:t>loadbalacer</a:t>
+            </a:r>
+            <a:r>
+              <a:rPr lang="en-US" dirty="0"/>
+              <a:t>/</a:t>
+            </a:r>
+            <a:r>
+              <a:rPr lang="en-US" dirty="0" err="1"/>
+              <a:t>ip</a:t>
+            </a:r>
+            <a:endParaRPr lang="en-US" dirty="0"/>
+          </a:p>
+          <a:p>
+            <a:endParaRPr lang="en-US" dirty="0"/>
+          </a:p>
+        </p:txBody>
+      </p:sp>
+    </p:spTree>
+    <p:extLst>
+      <p:ext uri="{BB962C8B-B14F-4D97-AF65-F5344CB8AC3E}">
+        <p14:creationId xmlns:p14="http://schemas.microsoft.com/office/powerpoint/2010/main" val="1385610716"/>
+      </p:ext>
+    </p:extLst>
+  </p:cSld>
+  <p:clrMapOvr>
+    <a:masterClrMapping/>
+  </p:clrMapOvr>
+</p:sld>
+</file>
+
+<file path=ppt/slides/slide12.xml><?xml version="1.0" encoding="utf-8"?>
+<p:sld xmlns:a="http://schemas.openxmlformats.org/drawingml/2006/main" xmlns:r="http://schemas.openxmlformats.org/officeDocument/2006/relationships" xmlns:p="http://schemas.openxmlformats.org/presentationml/2006/main">
+  <p:cSld>
+    <p:spTree>
+      <p:nvGrpSpPr>
+        <p:cNvPr id="1" name=""/>
+        <p:cNvGrpSpPr/>
+        <p:nvPr/>
+      </p:nvGrpSpPr>
+      <p:grpSpPr>
+        <a:xfrm>
+          <a:off x="0" y="0"/>
+          <a:ext cx="0" cy="0"/>
+          <a:chOff x="0" y="0"/>
+          <a:chExt cx="0" cy="0"/>
+        </a:xfrm>
+      </p:grpSpPr>
+      <p:sp>
+        <p:nvSpPr>
+          <p:cNvPr id="2" name="Title 1">
+            <a:extLst>
+              <a:ext uri="{FF2B5EF4-FFF2-40B4-BE49-F238E27FC236}">
+                <a16:creationId xmlns:a16="http://schemas.microsoft.com/office/drawing/2014/main" id="{A8C54662-DEF1-F942-9F6F-F82BD2B52B35}"/>
+              </a:ext>
+            </a:extLst>
+          </p:cNvPr>
+          <p:cNvSpPr>
+            <a:spLocks noGrp="1"/>
+          </p:cNvSpPr>
+          <p:nvPr>
+            <p:ph type="title"/>
+          </p:nvPr>
+        </p:nvSpPr>
+        <p:spPr/>
+        <p:txBody>
+          <a:bodyPr/>
+          <a:lstStyle/>
+          <a:p>
+            <a:r>
+              <a:rPr lang="en-US" dirty="0"/>
+              <a:t>Where’s it at:</a:t>
+            </a:r>
+          </a:p>
+        </p:txBody>
+      </p:sp>
+      <p:pic>
+        <p:nvPicPr>
+          <p:cNvPr id="5" name="Content Placeholder 4">
+            <a:extLst>
+              <a:ext uri="{FF2B5EF4-FFF2-40B4-BE49-F238E27FC236}">
+                <a16:creationId xmlns:a16="http://schemas.microsoft.com/office/drawing/2014/main" id="{A72C5B3E-AACC-744E-8BEE-6788FF38C896}"/>
+              </a:ext>
+            </a:extLst>
+          </p:cNvPr>
+          <p:cNvPicPr>
+            <a:picLocks noGrp="1" noChangeAspect="1"/>
+          </p:cNvPicPr>
+          <p:nvPr>
+            <p:ph idx="1"/>
+          </p:nvPr>
+        </p:nvPicPr>
+        <p:blipFill>
+          <a:blip r:embed="rId2"/>
+          <a:stretch>
+            <a:fillRect/>
+          </a:stretch>
+        </p:blipFill>
+        <p:spPr>
+          <a:xfrm>
+            <a:off x="2097473" y="1825625"/>
+            <a:ext cx="7997053" cy="4351338"/>
+          </a:xfrm>
+        </p:spPr>
+      </p:pic>
+      <p:sp>
+        <p:nvSpPr>
+          <p:cNvPr id="6" name="TextBox 5">
+            <a:extLst>
+              <a:ext uri="{FF2B5EF4-FFF2-40B4-BE49-F238E27FC236}">
+                <a16:creationId xmlns:a16="http://schemas.microsoft.com/office/drawing/2014/main" id="{086F95A8-E67A-234E-AD28-B142E36EF402}"/>
+              </a:ext>
+            </a:extLst>
+          </p:cNvPr>
+          <p:cNvSpPr txBox="1"/>
+          <p:nvPr/>
+        </p:nvSpPr>
+        <p:spPr>
+          <a:xfrm>
+            <a:off x="3422822" y="6311900"/>
+            <a:ext cx="11108724" cy="369332"/>
+          </a:xfrm>
+          <a:prstGeom prst="rect">
+            <a:avLst/>
+          </a:prstGeom>
+          <a:noFill/>
+        </p:spPr>
+        <p:txBody>
+          <a:bodyPr wrap="square" rtlCol="0">
+            <a:spAutoFit/>
+          </a:bodyPr>
+          <a:lstStyle/>
+          <a:p>
+            <a:r>
+              <a:rPr lang="en-SG" dirty="0">
+                <a:hlinkClick r:id="rId3"/>
+              </a:rPr>
+              <a:t>https://github.com/glennswest/ocpupi4azure/tree/master/4.1</a:t>
+            </a:r>
+            <a:endParaRPr lang="en-US" dirty="0"/>
+          </a:p>
+        </p:txBody>
+      </p:sp>
+    </p:spTree>
+    <p:extLst>
+      <p:ext uri="{BB962C8B-B14F-4D97-AF65-F5344CB8AC3E}">
+        <p14:creationId xmlns:p14="http://schemas.microsoft.com/office/powerpoint/2010/main" val="1371541681"/>
+      </p:ext>
+    </p:extLst>
+  </p:cSld>
+  <p:clrMapOvr>
+    <a:masterClrMapping/>
+  </p:clrMapOvr>
+</p:sld>
+</file>
+
 <file path=ppt/slides/slide2.xml><?xml version="1.0" encoding="utf-8"?>
+<p:sld xmlns:a="http://schemas.openxmlformats.org/drawingml/2006/main" xmlns:r="http://schemas.openxmlformats.org/officeDocument/2006/relationships" xmlns:p="http://schemas.openxmlformats.org/presentationml/2006/main">
+  <p:cSld>
+    <p:spTree>
+      <p:nvGrpSpPr>
+        <p:cNvPr id="1" name=""/>
+        <p:cNvGrpSpPr/>
+        <p:nvPr/>
+      </p:nvGrpSpPr>
+      <p:grpSpPr>
+        <a:xfrm>
+          <a:off x="0" y="0"/>
+          <a:ext cx="0" cy="0"/>
+          <a:chOff x="0" y="0"/>
+          <a:chExt cx="0" cy="0"/>
+        </a:xfrm>
+      </p:grpSpPr>
+      <p:sp>
+        <p:nvSpPr>
+          <p:cNvPr id="2" name="Title 1">
+            <a:extLst>
+              <a:ext uri="{FF2B5EF4-FFF2-40B4-BE49-F238E27FC236}">
+                <a16:creationId xmlns:a16="http://schemas.microsoft.com/office/drawing/2014/main" id="{116C6F92-AD31-E845-AB21-783841209A06}"/>
+              </a:ext>
+            </a:extLst>
+          </p:cNvPr>
+          <p:cNvSpPr>
+            <a:spLocks noGrp="1"/>
+          </p:cNvSpPr>
+          <p:nvPr>
+            <p:ph type="title"/>
+          </p:nvPr>
+        </p:nvSpPr>
+        <p:spPr/>
+        <p:txBody>
+          <a:bodyPr/>
+          <a:lstStyle/>
+          <a:p>
+            <a:r>
+              <a:rPr lang="en-US" dirty="0"/>
+              <a:t>WIP</a:t>
+            </a:r>
+          </a:p>
+        </p:txBody>
+      </p:sp>
+      <p:sp>
+        <p:nvSpPr>
+          <p:cNvPr id="3" name="Content Placeholder 2">
+            <a:extLst>
+              <a:ext uri="{FF2B5EF4-FFF2-40B4-BE49-F238E27FC236}">
+                <a16:creationId xmlns:a16="http://schemas.microsoft.com/office/drawing/2014/main" id="{5F6C3014-E739-064F-9438-84A785180F7F}"/>
+              </a:ext>
+            </a:extLst>
+          </p:cNvPr>
+          <p:cNvSpPr>
+            <a:spLocks noGrp="1"/>
+          </p:cNvSpPr>
+          <p:nvPr>
+            <p:ph idx="1"/>
+          </p:nvPr>
+        </p:nvSpPr>
+        <p:spPr/>
+        <p:txBody>
+          <a:bodyPr>
+            <a:normAutofit fontScale="92500"/>
+          </a:bodyPr>
+          <a:lstStyle/>
+          <a:p>
+            <a:r>
+              <a:rPr lang="en-SG" strike="sngStrike" dirty="0"/>
+              <a:t>Reconfigure internal load balancer to handle node boots - size 2</a:t>
+            </a:r>
+          </a:p>
+          <a:p>
+            <a:r>
+              <a:rPr lang="en-SG" dirty="0"/>
+              <a:t>Fix wildcard app </a:t>
+            </a:r>
+            <a:r>
+              <a:rPr lang="en-SG" dirty="0" err="1"/>
+              <a:t>loadbalacer</a:t>
+            </a:r>
+            <a:r>
+              <a:rPr lang="en-SG" dirty="0"/>
+              <a:t> - size 2</a:t>
+            </a:r>
+          </a:p>
+          <a:p>
+            <a:r>
+              <a:rPr lang="en-SG" strike="sngStrike" dirty="0"/>
+              <a:t>Chance scripts to </a:t>
+            </a:r>
+            <a:r>
+              <a:rPr lang="en-SG" strike="sngStrike" dirty="0" err="1"/>
+              <a:t>parmertise</a:t>
+            </a:r>
+            <a:r>
+              <a:rPr lang="en-SG" strike="sngStrike" dirty="0"/>
+              <a:t> resource group name - size 1</a:t>
+            </a:r>
+          </a:p>
+          <a:p>
+            <a:r>
+              <a:rPr lang="en-SG" strike="sngStrike" dirty="0"/>
+              <a:t>Change to use 4.2 </a:t>
+            </a:r>
+            <a:r>
+              <a:rPr lang="en-SG" strike="sngStrike" dirty="0" err="1"/>
+              <a:t>nightlies</a:t>
+            </a:r>
+            <a:r>
+              <a:rPr lang="en-SG" strike="sngStrike" dirty="0"/>
+              <a:t> - size 2</a:t>
+            </a:r>
+          </a:p>
+          <a:p>
+            <a:r>
+              <a:rPr lang="en-SG" dirty="0"/>
+              <a:t>Add azure cloud provider - size 3</a:t>
+            </a:r>
+          </a:p>
+          <a:p>
+            <a:r>
+              <a:rPr lang="en-SG" dirty="0" err="1"/>
+              <a:t>Dns</a:t>
+            </a:r>
+            <a:r>
+              <a:rPr lang="en-SG" dirty="0"/>
+              <a:t> local or automation - size 2</a:t>
+            </a:r>
+          </a:p>
+          <a:p>
+            <a:r>
+              <a:rPr lang="en-SG" dirty="0"/>
+              <a:t>Add bastion for debug - size 1</a:t>
+            </a:r>
+          </a:p>
+          <a:p>
+            <a:r>
+              <a:rPr lang="en-SG" dirty="0"/>
+              <a:t>Work to support ci of azure arm </a:t>
+            </a:r>
+            <a:r>
+              <a:rPr lang="en-SG" dirty="0" err="1"/>
+              <a:t>upi</a:t>
+            </a:r>
+            <a:r>
+              <a:rPr lang="en-SG" dirty="0"/>
+              <a:t> - need help from someone who does ci</a:t>
+            </a:r>
+          </a:p>
+          <a:p>
+            <a:r>
+              <a:rPr lang="en-SG" dirty="0" err="1"/>
+              <a:t>Cleanup</a:t>
+            </a:r>
+            <a:r>
+              <a:rPr lang="en-SG" dirty="0"/>
+              <a:t> of scripts</a:t>
+            </a:r>
+          </a:p>
+          <a:p>
+            <a:pPr marL="0" indent="0">
+              <a:buNone/>
+            </a:pPr>
+            <a:endParaRPr lang="en-US" dirty="0"/>
+          </a:p>
+        </p:txBody>
+      </p:sp>
+    </p:spTree>
+    <p:extLst>
+      <p:ext uri="{BB962C8B-B14F-4D97-AF65-F5344CB8AC3E}">
+        <p14:creationId xmlns:p14="http://schemas.microsoft.com/office/powerpoint/2010/main" val="1268889644"/>
+      </p:ext>
+    </p:extLst>
+  </p:cSld>
+  <p:clrMapOvr>
+    <a:masterClrMapping/>
+  </p:clrMapOvr>
+</p:sld>
+</file>
+
+<file path=ppt/slides/slide3.xml><?xml version="1.0" encoding="utf-8"?>
 <p:sld xmlns:a="http://schemas.openxmlformats.org/drawingml/2006/main" xmlns:r="http://schemas.openxmlformats.org/officeDocument/2006/relationships" xmlns:p="http://schemas.openxmlformats.org/presentationml/2006/main">
   <p:cSld>
     <p:spTree>
@@ -3219,7 +3812,7 @@
 </p:sld>
 </file>
 
-<file path=ppt/slides/slide3.xml><?xml version="1.0" encoding="utf-8"?>
+<file path=ppt/slides/slide4.xml><?xml version="1.0" encoding="utf-8"?>
 <p:sld xmlns:a="http://schemas.openxmlformats.org/drawingml/2006/main" xmlns:r="http://schemas.openxmlformats.org/officeDocument/2006/relationships" xmlns:p="http://schemas.openxmlformats.org/presentationml/2006/main">
   <p:cSld>
     <p:spTree>
@@ -3306,7 +3899,7 @@
 </p:sld>
 </file>
 
-<file path=ppt/slides/slide4.xml><?xml version="1.0" encoding="utf-8"?>
+<file path=ppt/slides/slide5.xml><?xml version="1.0" encoding="utf-8"?>
 <p:sld xmlns:a="http://schemas.openxmlformats.org/drawingml/2006/main" xmlns:r="http://schemas.openxmlformats.org/officeDocument/2006/relationships" xmlns:p="http://schemas.openxmlformats.org/presentationml/2006/main">
   <p:cSld>
     <p:spTree>
@@ -3393,7 +3986,7 @@
 </p:sld>
 </file>
 
-<file path=ppt/slides/slide5.xml><?xml version="1.0" encoding="utf-8"?>
+<file path=ppt/slides/slide6.xml><?xml version="1.0" encoding="utf-8"?>
 <p:sld xmlns:a="http://schemas.openxmlformats.org/drawingml/2006/main" xmlns:r="http://schemas.openxmlformats.org/officeDocument/2006/relationships" xmlns:p="http://schemas.openxmlformats.org/presentationml/2006/main">
   <p:cSld>
     <p:spTree>
@@ -3484,7 +4077,7 @@
 </p:sld>
 </file>
 
-<file path=ppt/slides/slide6.xml><?xml version="1.0" encoding="utf-8"?>
+<file path=ppt/slides/slide7.xml><?xml version="1.0" encoding="utf-8"?>
 <p:sld xmlns:a="http://schemas.openxmlformats.org/drawingml/2006/main" xmlns:r="http://schemas.openxmlformats.org/officeDocument/2006/relationships" xmlns:p="http://schemas.openxmlformats.org/presentationml/2006/main">
   <p:cSld>
     <p:spTree>
@@ -3574,143 +4167,6 @@
 </p:sld>
 </file>
 
-<file path=ppt/slides/slide7.xml><?xml version="1.0" encoding="utf-8"?>
-<p:sld xmlns:a="http://schemas.openxmlformats.org/drawingml/2006/main" xmlns:r="http://schemas.openxmlformats.org/officeDocument/2006/relationships" xmlns:p="http://schemas.openxmlformats.org/presentationml/2006/main">
-  <p:cSld>
-    <p:spTree>
-      <p:nvGrpSpPr>
-        <p:cNvPr id="1" name=""/>
-        <p:cNvGrpSpPr/>
-        <p:nvPr/>
-      </p:nvGrpSpPr>
-      <p:grpSpPr>
-        <a:xfrm>
-          <a:off x="0" y="0"/>
-          <a:ext cx="0" cy="0"/>
-          <a:chOff x="0" y="0"/>
-          <a:chExt cx="0" cy="0"/>
-        </a:xfrm>
-      </p:grpSpPr>
-      <p:sp>
-        <p:nvSpPr>
-          <p:cNvPr id="2" name="Title 1">
-            <a:extLst>
-              <a:ext uri="{FF2B5EF4-FFF2-40B4-BE49-F238E27FC236}">
-                <a16:creationId xmlns:a16="http://schemas.microsoft.com/office/drawing/2014/main" id="{F11BB6C5-B0BC-284D-B750-03E902999E52}"/>
-              </a:ext>
-            </a:extLst>
-          </p:cNvPr>
-          <p:cNvSpPr>
-            <a:spLocks noGrp="1"/>
-          </p:cNvSpPr>
-          <p:nvPr>
-            <p:ph type="title"/>
-          </p:nvPr>
-        </p:nvSpPr>
-        <p:spPr/>
-        <p:txBody>
-          <a:bodyPr/>
-          <a:lstStyle/>
-          <a:p>
-            <a:r>
-              <a:rPr lang="en-US" dirty="0"/>
-              <a:t>Current Status</a:t>
-            </a:r>
-          </a:p>
-        </p:txBody>
-      </p:sp>
-      <p:sp>
-        <p:nvSpPr>
-          <p:cNvPr id="3" name="Content Placeholder 2">
-            <a:extLst>
-              <a:ext uri="{FF2B5EF4-FFF2-40B4-BE49-F238E27FC236}">
-                <a16:creationId xmlns:a16="http://schemas.microsoft.com/office/drawing/2014/main" id="{F2711C76-5A4E-C342-B33A-483915423E9F}"/>
-              </a:ext>
-            </a:extLst>
-          </p:cNvPr>
-          <p:cNvSpPr>
-            <a:spLocks noGrp="1"/>
-          </p:cNvSpPr>
-          <p:nvPr>
-            <p:ph idx="1"/>
-          </p:nvPr>
-        </p:nvSpPr>
-        <p:spPr/>
-        <p:txBody>
-          <a:bodyPr/>
-          <a:lstStyle/>
-          <a:p>
-            <a:r>
-              <a:rPr lang="en-US" dirty="0"/>
-              <a:t>Working:</a:t>
-            </a:r>
-          </a:p>
-          <a:p>
-            <a:pPr lvl="1"/>
-            <a:r>
-              <a:rPr lang="en-US" dirty="0"/>
-              <a:t>Internal Load Balancer is Fixed and Working</a:t>
-            </a:r>
-          </a:p>
-          <a:p>
-            <a:r>
-              <a:rPr lang="en-US" dirty="0"/>
-              <a:t>Not Done/Not Working:</a:t>
-            </a:r>
-          </a:p>
-          <a:p>
-            <a:pPr lvl="1"/>
-            <a:r>
-              <a:rPr lang="en-US" dirty="0"/>
-              <a:t>Flake on one of the masters – </a:t>
-            </a:r>
-            <a:r>
-              <a:rPr lang="en-US" dirty="0" err="1"/>
-              <a:t>kubelet</a:t>
-            </a:r>
-            <a:r>
-              <a:rPr lang="en-US" dirty="0"/>
-              <a:t> not starting Internal LB Not routing/not found by masters</a:t>
-            </a:r>
-          </a:p>
-          <a:p>
-            <a:pPr lvl="1"/>
-            <a:r>
-              <a:rPr lang="en-US" dirty="0"/>
-              <a:t>Need to fix up the apps </a:t>
-            </a:r>
-            <a:r>
-              <a:rPr lang="en-US" dirty="0" err="1"/>
-              <a:t>loadbalacer</a:t>
-            </a:r>
-            <a:r>
-              <a:rPr lang="en-US" dirty="0"/>
-              <a:t>/</a:t>
-            </a:r>
-            <a:r>
-              <a:rPr lang="en-US" dirty="0" err="1"/>
-              <a:t>ip</a:t>
-            </a:r>
-            <a:endParaRPr lang="en-US" dirty="0"/>
-          </a:p>
-          <a:p>
-            <a:endParaRPr lang="en-US" dirty="0"/>
-          </a:p>
-        </p:txBody>
-      </p:sp>
-    </p:spTree>
-    <p:extLst>
-      <p:ext uri="{BB962C8B-B14F-4D97-AF65-F5344CB8AC3E}">
-        <p14:creationId xmlns:p14="http://schemas.microsoft.com/office/powerpoint/2010/main" val="1385610716"/>
-      </p:ext>
-    </p:extLst>
-  </p:cSld>
-  <p:clrMapOvr>
-    <a:masterClrMapping/>
-  </p:clrMapOvr>
-</p:sld>
-</file>
-
 <file path=ppt/slides/slide8.xml><?xml version="1.0" encoding="utf-8"?>
 <p:sld xmlns:a="http://schemas.openxmlformats.org/drawingml/2006/main" xmlns:r="http://schemas.openxmlformats.org/officeDocument/2006/relationships" xmlns:p="http://schemas.openxmlformats.org/presentationml/2006/main">
   <p:cSld>
@@ -3733,7 +4189,7 @@
           <p:cNvPr id="2" name="Title 1">
             <a:extLst>
               <a:ext uri="{FF2B5EF4-FFF2-40B4-BE49-F238E27FC236}">
-                <a16:creationId xmlns:a16="http://schemas.microsoft.com/office/drawing/2014/main" id="{A8C54662-DEF1-F942-9F6F-F82BD2B52B35}"/>
+                <a16:creationId xmlns:a16="http://schemas.microsoft.com/office/drawing/2014/main" id="{44F256A8-EE8E-C84C-A70F-B1430EE4061F}"/>
               </a:ext>
             </a:extLst>
           </p:cNvPr>
@@ -3751,26 +4207,81 @@
           <a:p>
             <a:r>
               <a:rPr lang="en-US" dirty="0"/>
-              <a:t>Where’s it at:</a:t>
-            </a:r>
+              <a:t>Azure VHD</a:t>
+            </a:r>
+          </a:p>
+        </p:txBody>
+      </p:sp>
+      <p:sp>
+        <p:nvSpPr>
+          <p:cNvPr id="3" name="Content Placeholder 2">
+            <a:extLst>
+              <a:ext uri="{FF2B5EF4-FFF2-40B4-BE49-F238E27FC236}">
+                <a16:creationId xmlns:a16="http://schemas.microsoft.com/office/drawing/2014/main" id="{A8E1118E-2C6B-EA49-952C-EBE3D4AABB3A}"/>
+              </a:ext>
+            </a:extLst>
+          </p:cNvPr>
+          <p:cNvSpPr>
+            <a:spLocks noGrp="1"/>
+          </p:cNvSpPr>
+          <p:nvPr>
+            <p:ph idx="1"/>
+          </p:nvPr>
+        </p:nvSpPr>
+        <p:spPr/>
+        <p:txBody>
+          <a:bodyPr/>
+          <a:lstStyle/>
+          <a:p>
+            <a:r>
+              <a:rPr lang="en-US" dirty="0"/>
+              <a:t>Currently Azure (VHD) VM Images are just stored in a storage account</a:t>
+            </a:r>
+          </a:p>
+          <a:p>
+            <a:r>
+              <a:rPr lang="en-US" dirty="0"/>
+              <a:t>Every time you run the ARM template due to this we must “copy” the image into the resource group used by the ARM template</a:t>
+            </a:r>
+          </a:p>
+          <a:p>
+            <a:r>
+              <a:rPr lang="en-US" dirty="0"/>
+              <a:t>Note that a normal “RHEL” Image has a different mechanism, that effectively includes distribution of images to all av zones, and speeds up the </a:t>
+            </a:r>
+            <a:r>
+              <a:rPr lang="en-US" dirty="0" err="1"/>
+              <a:t>vm</a:t>
+            </a:r>
+            <a:r>
+              <a:rPr lang="en-US" dirty="0"/>
+              <a:t> spin up. (10-20 minutes of extra time for storage account)</a:t>
+            </a:r>
+          </a:p>
+          <a:p>
+            <a:endParaRPr lang="en-US" dirty="0"/>
+          </a:p>
+          <a:p>
+            <a:pPr marL="0" indent="0">
+              <a:buNone/>
+            </a:pPr>
+            <a:endParaRPr lang="en-US" dirty="0"/>
           </a:p>
         </p:txBody>
       </p:sp>
       <p:pic>
         <p:nvPicPr>
-          <p:cNvPr id="5" name="Content Placeholder 4">
+          <p:cNvPr id="5" name="Picture 4">
             <a:extLst>
               <a:ext uri="{FF2B5EF4-FFF2-40B4-BE49-F238E27FC236}">
-                <a16:creationId xmlns:a16="http://schemas.microsoft.com/office/drawing/2014/main" id="{A72C5B3E-AACC-744E-8BEE-6788FF38C896}"/>
+                <a16:creationId xmlns:a16="http://schemas.microsoft.com/office/drawing/2014/main" id="{5DD9E822-542C-1F49-B11B-7CF87CE90C89}"/>
               </a:ext>
             </a:extLst>
           </p:cNvPr>
           <p:cNvPicPr>
-            <a:picLocks noGrp="1" noChangeAspect="1"/>
+            <a:picLocks noChangeAspect="1"/>
           </p:cNvPicPr>
-          <p:nvPr>
-            <p:ph idx="1"/>
-          </p:nvPr>
+          <p:nvPr/>
         </p:nvPicPr>
         <p:blipFill>
           <a:blip r:embed="rId2"/>
@@ -3780,53 +4291,142 @@
         </p:blipFill>
         <p:spPr>
           <a:xfrm>
-            <a:off x="2097473" y="1825625"/>
-            <a:ext cx="7997053" cy="4351338"/>
-          </a:xfrm>
-        </p:spPr>
-      </p:pic>
-      <p:sp>
-        <p:nvSpPr>
-          <p:cNvPr id="6" name="TextBox 5">
-            <a:extLst>
-              <a:ext uri="{FF2B5EF4-FFF2-40B4-BE49-F238E27FC236}">
-                <a16:creationId xmlns:a16="http://schemas.microsoft.com/office/drawing/2014/main" id="{086F95A8-E67A-234E-AD28-B142E36EF402}"/>
-              </a:ext>
-            </a:extLst>
-          </p:cNvPr>
-          <p:cNvSpPr txBox="1"/>
-          <p:nvPr/>
-        </p:nvSpPr>
-        <p:spPr>
-          <a:xfrm>
-            <a:off x="3422822" y="6311900"/>
-            <a:ext cx="11108724" cy="369332"/>
+            <a:off x="838200" y="4581434"/>
+            <a:ext cx="11087100" cy="2032000"/>
           </a:xfrm>
           <a:prstGeom prst="rect">
             <a:avLst/>
           </a:prstGeom>
-          <a:noFill/>
         </p:spPr>
-        <p:txBody>
-          <a:bodyPr wrap="square" rtlCol="0">
-            <a:spAutoFit/>
-          </a:bodyPr>
-          <a:lstStyle/>
-          <a:p>
-            <a:r>
-              <a:rPr lang="en-SG" dirty="0">
-                <a:hlinkClick r:id="rId3"/>
-              </a:rPr>
-              <a:t>https://github.com/glennswest/ocpupi4azure/tree/master/4.1</a:t>
-            </a:r>
-            <a:endParaRPr lang="en-US" dirty="0"/>
-          </a:p>
-        </p:txBody>
-      </p:sp>
+      </p:pic>
     </p:spTree>
     <p:extLst>
       <p:ext uri="{BB962C8B-B14F-4D97-AF65-F5344CB8AC3E}">
-        <p14:creationId xmlns:p14="http://schemas.microsoft.com/office/powerpoint/2010/main" val="1371541681"/>
+        <p14:creationId xmlns:p14="http://schemas.microsoft.com/office/powerpoint/2010/main" val="1966120259"/>
+      </p:ext>
+    </p:extLst>
+  </p:cSld>
+  <p:clrMapOvr>
+    <a:masterClrMapping/>
+  </p:clrMapOvr>
+</p:sld>
+</file>
+
+<file path=ppt/slides/slide9.xml><?xml version="1.0" encoding="utf-8"?>
+<p:sld xmlns:a="http://schemas.openxmlformats.org/drawingml/2006/main" xmlns:r="http://schemas.openxmlformats.org/officeDocument/2006/relationships" xmlns:p="http://schemas.openxmlformats.org/presentationml/2006/main">
+  <p:cSld>
+    <p:spTree>
+      <p:nvGrpSpPr>
+        <p:cNvPr id="1" name=""/>
+        <p:cNvGrpSpPr/>
+        <p:nvPr/>
+      </p:nvGrpSpPr>
+      <p:grpSpPr>
+        <a:xfrm>
+          <a:off x="0" y="0"/>
+          <a:ext cx="0" cy="0"/>
+          <a:chOff x="0" y="0"/>
+          <a:chExt cx="0" cy="0"/>
+        </a:xfrm>
+      </p:grpSpPr>
+      <p:sp>
+        <p:nvSpPr>
+          <p:cNvPr id="2" name="Title 1">
+            <a:extLst>
+              <a:ext uri="{FF2B5EF4-FFF2-40B4-BE49-F238E27FC236}">
+                <a16:creationId xmlns:a16="http://schemas.microsoft.com/office/drawing/2014/main" id="{35141668-8ACA-5C46-BBD5-9054B5391F3F}"/>
+              </a:ext>
+            </a:extLst>
+          </p:cNvPr>
+          <p:cNvSpPr>
+            <a:spLocks noGrp="1"/>
+          </p:cNvSpPr>
+          <p:nvPr>
+            <p:ph type="title"/>
+          </p:nvPr>
+        </p:nvSpPr>
+        <p:spPr/>
+        <p:txBody>
+          <a:bodyPr/>
+          <a:lstStyle/>
+          <a:p>
+            <a:r>
+              <a:rPr lang="en-US" dirty="0"/>
+              <a:t>Card – </a:t>
+            </a:r>
+            <a:r>
+              <a:rPr lang="en-US" dirty="0" err="1"/>
+              <a:t>Parametertised</a:t>
+            </a:r>
+            <a:r>
+              <a:rPr lang="en-US" dirty="0"/>
+              <a:t> scripts</a:t>
+            </a:r>
+          </a:p>
+        </p:txBody>
+      </p:sp>
+      <p:sp>
+        <p:nvSpPr>
+          <p:cNvPr id="3" name="Content Placeholder 2">
+            <a:extLst>
+              <a:ext uri="{FF2B5EF4-FFF2-40B4-BE49-F238E27FC236}">
+                <a16:creationId xmlns:a16="http://schemas.microsoft.com/office/drawing/2014/main" id="{267AF53C-186A-3941-8F79-A6DF1E6A9296}"/>
+              </a:ext>
+            </a:extLst>
+          </p:cNvPr>
+          <p:cNvSpPr>
+            <a:spLocks noGrp="1"/>
+          </p:cNvSpPr>
+          <p:nvPr>
+            <p:ph idx="1"/>
+          </p:nvPr>
+        </p:nvSpPr>
+        <p:spPr/>
+        <p:txBody>
+          <a:bodyPr/>
+          <a:lstStyle/>
+          <a:p>
+            <a:r>
+              <a:rPr lang="en-US" dirty="0"/>
+              <a:t>Scripts have been changed to support giving the resource group on command line</a:t>
+            </a:r>
+          </a:p>
+        </p:txBody>
+      </p:sp>
+      <p:pic>
+        <p:nvPicPr>
+          <p:cNvPr id="5" name="Picture 4">
+            <a:extLst>
+              <a:ext uri="{FF2B5EF4-FFF2-40B4-BE49-F238E27FC236}">
+                <a16:creationId xmlns:a16="http://schemas.microsoft.com/office/drawing/2014/main" id="{EC3F500A-09F3-3143-80EA-20C511F9BE53}"/>
+              </a:ext>
+            </a:extLst>
+          </p:cNvPr>
+          <p:cNvPicPr>
+            <a:picLocks noChangeAspect="1"/>
+          </p:cNvPicPr>
+          <p:nvPr/>
+        </p:nvPicPr>
+        <p:blipFill>
+          <a:blip r:embed="rId2"/>
+          <a:stretch>
+            <a:fillRect/>
+          </a:stretch>
+        </p:blipFill>
+        <p:spPr>
+          <a:xfrm>
+            <a:off x="3892731" y="3266456"/>
+            <a:ext cx="4921431" cy="994757"/>
+          </a:xfrm>
+          <a:prstGeom prst="rect">
+            <a:avLst/>
+          </a:prstGeom>
+        </p:spPr>
+      </p:pic>
+    </p:spTree>
+    <p:extLst>
+      <p:ext uri="{BB962C8B-B14F-4D97-AF65-F5344CB8AC3E}">
+        <p14:creationId xmlns:p14="http://schemas.microsoft.com/office/powerpoint/2010/main" val="902688165"/>
       </p:ext>
     </p:extLst>
   </p:cSld>

</xml_diff>